<commit_message>
Added the sprint Meeting protocol from the 13.04.2015
</commit_message>
<xml_diff>
--- a/Docs/30_Design/Präsi.pptx
+++ b/Docs/30_Design/Präsi.pptx
@@ -117,7 +117,7 @@
   </p:defaultTextStyle>
   <p:extLst>
     <p:ext uri="{EFAFB233-063F-42B5-8137-9DF3F51BA10A}">
-      <p15:sldGuideLst xmlns:p15="http://schemas.microsoft.com/office/powerpoint/2012/main" xmlns=""/>
+      <p15:sldGuideLst xmlns="" xmlns:p15="http://schemas.microsoft.com/office/powerpoint/2012/main"/>
     </p:ext>
   </p:extLst>
 </p:presentation>
@@ -267,7 +267,7 @@
             <a:fld id="{B61BEF0D-F0BB-DE4B-95CE-6DB70DBA9567}" type="datetimeFigureOut">
               <a:rPr lang="en-US" smtClean="0"/>
               <a:pPr/>
-              <a:t>4/12/2015</a:t>
+              <a:t>4/14/2015</a:t>
             </a:fld>
             <a:endParaRPr lang="en-US" dirty="0"/>
           </a:p>
@@ -499,7 +499,7 @@
           <a:p>
             <a:fld id="{55C6B4A9-1611-4792-9094-5F34BCA07E0B}" type="datetimeFigureOut">
               <a:rPr lang="en-US" smtClean="0"/>
-              <a:t>4/12/2015</a:t>
+              <a:t>4/14/2015</a:t>
             </a:fld>
             <a:endParaRPr lang="en-US" dirty="0"/>
           </a:p>
@@ -704,7 +704,7 @@
             <a:fld id="{B61BEF0D-F0BB-DE4B-95CE-6DB70DBA9567}" type="datetimeFigureOut">
               <a:rPr lang="en-US" smtClean="0"/>
               <a:pPr/>
-              <a:t>4/12/2015</a:t>
+              <a:t>4/14/2015</a:t>
             </a:fld>
             <a:endParaRPr lang="en-US" dirty="0"/>
           </a:p>
@@ -904,7 +904,7 @@
             <a:fld id="{B61BEF0D-F0BB-DE4B-95CE-6DB70DBA9567}" type="datetimeFigureOut">
               <a:rPr lang="en-US" smtClean="0"/>
               <a:pPr/>
-              <a:t>4/12/2015</a:t>
+              <a:t>4/14/2015</a:t>
             </a:fld>
             <a:endParaRPr lang="en-US" dirty="0"/>
           </a:p>
@@ -1176,7 +1176,7 @@
             <a:fld id="{B61BEF0D-F0BB-DE4B-95CE-6DB70DBA9567}" type="datetimeFigureOut">
               <a:rPr lang="en-US" smtClean="0"/>
               <a:pPr/>
-              <a:t>4/12/2015</a:t>
+              <a:t>4/14/2015</a:t>
             </a:fld>
             <a:endParaRPr lang="en-US" dirty="0"/>
           </a:p>
@@ -1433,7 +1433,7 @@
           <a:p>
             <a:fld id="{EB712588-04B1-427B-82EE-E8DB90309F08}" type="datetimeFigureOut">
               <a:rPr lang="en-US" smtClean="0"/>
-              <a:t>4/12/2015</a:t>
+              <a:t>4/14/2015</a:t>
             </a:fld>
             <a:endParaRPr lang="en-US" dirty="0"/>
           </a:p>
@@ -1825,7 +1825,7 @@
             <a:fld id="{B61BEF0D-F0BB-DE4B-95CE-6DB70DBA9567}" type="datetimeFigureOut">
               <a:rPr lang="en-US" smtClean="0"/>
               <a:pPr/>
-              <a:t>4/12/2015</a:t>
+              <a:t>4/14/2015</a:t>
             </a:fld>
             <a:endParaRPr lang="en-US" dirty="0"/>
           </a:p>
@@ -1969,7 +1969,7 @@
             <a:fld id="{B61BEF0D-F0BB-DE4B-95CE-6DB70DBA9567}" type="datetimeFigureOut">
               <a:rPr lang="en-US" smtClean="0"/>
               <a:pPr/>
-              <a:t>4/12/2015</a:t>
+              <a:t>4/14/2015</a:t>
             </a:fld>
             <a:endParaRPr lang="en-US" dirty="0"/>
           </a:p>
@@ -2090,7 +2090,7 @@
             <a:fld id="{B61BEF0D-F0BB-DE4B-95CE-6DB70DBA9567}" type="datetimeFigureOut">
               <a:rPr lang="en-US" smtClean="0"/>
               <a:pPr/>
-              <a:t>4/12/2015</a:t>
+              <a:t>4/14/2015</a:t>
             </a:fld>
             <a:endParaRPr lang="en-US" dirty="0"/>
           </a:p>
@@ -2392,7 +2392,7 @@
           <a:p>
             <a:fld id="{42A54C80-263E-416B-A8E0-580EDEADCBDC}" type="datetimeFigureOut">
               <a:rPr lang="en-US" smtClean="0"/>
-              <a:t>4/12/2015</a:t>
+              <a:t>4/14/2015</a:t>
             </a:fld>
             <a:endParaRPr lang="en-US" dirty="0"/>
           </a:p>
@@ -2670,7 +2670,7 @@
             <a:fld id="{B61BEF0D-F0BB-DE4B-95CE-6DB70DBA9567}" type="datetimeFigureOut">
               <a:rPr lang="en-US" smtClean="0"/>
               <a:pPr/>
-              <a:t>4/12/2015</a:t>
+              <a:t>4/14/2015</a:t>
             </a:fld>
             <a:endParaRPr lang="en-US" dirty="0"/>
           </a:p>
@@ -2891,7 +2891,7 @@
             <a:fld id="{B61BEF0D-F0BB-DE4B-95CE-6DB70DBA9567}" type="datetimeFigureOut">
               <a:rPr lang="en-US" smtClean="0"/>
               <a:pPr/>
-              <a:t>4/12/2015</a:t>
+              <a:t>4/14/2015</a:t>
             </a:fld>
             <a:endParaRPr lang="en-US" dirty="0"/>
           </a:p>
@@ -4116,7 +4116,6 @@
               <a:rPr lang="de-DE" dirty="0"/>
               <a:t>Backend-Übersicht</a:t>
             </a:r>
-            <a:endParaRPr lang="de-DE" dirty="0"/>
           </a:p>
         </p:txBody>
       </p:sp>
@@ -4631,7 +4630,7 @@
   <a:extraClrSchemeLst/>
   <a:extLst>
     <a:ext uri="{05A4C25C-085E-4340-85A3-A5531E510DB2}">
-      <thm15:themeFamily xmlns:thm15="http://schemas.microsoft.com/office/thememl/2012/main" xmlns="" name="Office Theme" id="{62F939B6-93AF-4DB8-9C6B-D6C7DFDC589F}" vid="{4A3C46E8-61CC-4603-A589-7422A47A8E4A}"/>
+      <thm15:themeFamily xmlns="" xmlns:thm15="http://schemas.microsoft.com/office/thememl/2012/main" name="Office Theme" id="{62F939B6-93AF-4DB8-9C6B-D6C7DFDC589F}" vid="{4A3C46E8-61CC-4603-A589-7422A47A8E4A}"/>
     </a:ext>
   </a:extLst>
 </a:theme>

</xml_diff>